<commit_message>
Update TRASHES 직업 기획서 - 12.07.pptx
</commit_message>
<xml_diff>
--- a/기획/TRASHES 직업 기획서 - 12.07.pptx
+++ b/기획/TRASHES 직업 기획서 - 12.07.pptx
@@ -3611,7 +3611,7 @@
           <p:nvPr>
             <p:extLst>
               <p:ext uri="{D42A27DB-BD31-4B8C-83A1-F6EECF244321}">
-                <p14:modId xmlns:p14="http://schemas.microsoft.com/office/powerpoint/2010/main" val="859272943"/>
+                <p14:modId xmlns:p14="http://schemas.microsoft.com/office/powerpoint/2010/main" val="926881440"/>
               </p:ext>
             </p:extLst>
           </p:nvPr>
@@ -5148,7 +5148,7 @@
                       </a:pPr>
                       <a:r>
                         <a:rPr lang="en-US" altLang="ko-KR" sz="1000" dirty="0"/>
-                        <a:t>1.0</a:t>
+                        <a:t>10</a:t>
                       </a:r>
                       <a:endParaRPr lang="ko-KR" altLang="en-US" sz="1000" dirty="0"/>
                     </a:p>
@@ -6146,7 +6146,15 @@
             </a:r>
             <a:r>
               <a:rPr lang="ko-KR" altLang="en-US" sz="1400" dirty="0"/>
-              <a:t>총 발사 시 두 번 발사 함</a:t>
+              <a:t>총 발사 시 첫 번째 발사 후</a:t>
+            </a:r>
+            <a:r>
+              <a:rPr lang="en-US" altLang="ko-KR" sz="1400" dirty="0"/>
+              <a:t>, 0.3</a:t>
+            </a:r>
+            <a:r>
+              <a:rPr lang="ko-KR" altLang="en-US" sz="1400" dirty="0"/>
+              <a:t>초 뒤 한번 더 발사 함</a:t>
             </a:r>
             <a:r>
               <a:rPr lang="en-US" altLang="ko-KR" sz="1400" dirty="0"/>
@@ -6170,7 +6178,7 @@
           <p:nvPr>
             <p:extLst>
               <p:ext uri="{D42A27DB-BD31-4B8C-83A1-F6EECF244321}">
-                <p14:modId xmlns:p14="http://schemas.microsoft.com/office/powerpoint/2010/main" val="3369801872"/>
+                <p14:modId xmlns:p14="http://schemas.microsoft.com/office/powerpoint/2010/main" val="3561690079"/>
               </p:ext>
             </p:extLst>
           </p:nvPr>
@@ -7666,7 +7674,7 @@
                       </a:pPr>
                       <a:r>
                         <a:rPr lang="en-US" altLang="ko-KR" sz="1000" dirty="0"/>
-                        <a:t>1.0</a:t>
+                        <a:t>10</a:t>
                       </a:r>
                       <a:endParaRPr lang="ko-KR" altLang="en-US" sz="1000" dirty="0"/>
                     </a:p>
@@ -7810,7 +7818,7 @@
           <p:nvPr>
             <p:extLst>
               <p:ext uri="{D42A27DB-BD31-4B8C-83A1-F6EECF244321}">
-                <p14:modId xmlns:p14="http://schemas.microsoft.com/office/powerpoint/2010/main" val="3411616018"/>
+                <p14:modId xmlns:p14="http://schemas.microsoft.com/office/powerpoint/2010/main" val="1084752518"/>
               </p:ext>
             </p:extLst>
           </p:nvPr>
@@ -9556,7 +9564,7 @@
           <p:nvPr>
             <p:extLst>
               <p:ext uri="{D42A27DB-BD31-4B8C-83A1-F6EECF244321}">
-                <p14:modId xmlns:p14="http://schemas.microsoft.com/office/powerpoint/2010/main" val="759689303"/>
+                <p14:modId xmlns:p14="http://schemas.microsoft.com/office/powerpoint/2010/main" val="3363187799"/>
               </p:ext>
             </p:extLst>
           </p:nvPr>
@@ -11078,7 +11086,7 @@
                       </a:pPr>
                       <a:r>
                         <a:rPr lang="en-US" altLang="ko-KR" sz="1000" dirty="0"/>
-                        <a:t>1.0</a:t>
+                        <a:t>10</a:t>
                       </a:r>
                       <a:endParaRPr lang="ko-KR" altLang="en-US" sz="1000" dirty="0"/>
                     </a:p>
@@ -11403,7 +11411,7 @@
           <p:nvPr>
             <p:extLst>
               <p:ext uri="{D42A27DB-BD31-4B8C-83A1-F6EECF244321}">
-                <p14:modId xmlns:p14="http://schemas.microsoft.com/office/powerpoint/2010/main" val="2656973212"/>
+                <p14:modId xmlns:p14="http://schemas.microsoft.com/office/powerpoint/2010/main" val="529887732"/>
               </p:ext>
             </p:extLst>
           </p:nvPr>
@@ -11907,7 +11915,23 @@
                       </a:r>
                       <a:r>
                         <a:rPr lang="ko-KR" altLang="en-US" sz="1000" dirty="0"/>
-                        <a:t>사용시 다음 공격에 상대가 적중하면 </a:t>
+                        <a:t>사용시 </a:t>
+                      </a:r>
+                      <a:r>
+                        <a:rPr lang="en-US" altLang="ko-KR" sz="1000" dirty="0"/>
+                        <a:t>2</a:t>
+                      </a:r>
+                      <a:r>
+                        <a:rPr lang="ko-KR" altLang="en-US" sz="1000" dirty="0"/>
+                        <a:t>초간 집중한다</a:t>
+                      </a:r>
+                      <a:r>
+                        <a:rPr lang="en-US" altLang="ko-KR" sz="1000" dirty="0"/>
+                        <a:t>, </a:t>
+                      </a:r>
+                      <a:r>
+                        <a:rPr lang="ko-KR" altLang="en-US" sz="1000" dirty="0"/>
+                        <a:t>그리고 적중하면 </a:t>
                       </a:r>
                       <a:r>
                         <a:rPr lang="en-US" altLang="ko-KR" sz="1000" dirty="0"/>
@@ -11923,7 +11947,7 @@
                       </a:r>
                       <a:r>
                         <a:rPr lang="ko-KR" altLang="en-US" sz="1000" dirty="0"/>
-                        <a:t>를 닳게 한다</a:t>
+                        <a:t>를 닳게 하는 총알을 발사한다</a:t>
                       </a:r>
                       <a:r>
                         <a:rPr lang="en-US" altLang="ko-KR" sz="1000" dirty="0"/>
@@ -12398,7 +12422,7 @@
           <p:nvPr>
             <p:extLst>
               <p:ext uri="{D42A27DB-BD31-4B8C-83A1-F6EECF244321}">
-                <p14:modId xmlns:p14="http://schemas.microsoft.com/office/powerpoint/2010/main" val="1524913316"/>
+                <p14:modId xmlns:p14="http://schemas.microsoft.com/office/powerpoint/2010/main" val="1744967193"/>
               </p:ext>
             </p:extLst>
           </p:nvPr>
@@ -13927,7 +13951,7 @@
                       </a:pPr>
                       <a:r>
                         <a:rPr lang="en-US" altLang="ko-KR" sz="1000" dirty="0"/>
-                        <a:t>2.0</a:t>
+                        <a:t>20</a:t>
                       </a:r>
                       <a:endParaRPr lang="ko-KR" altLang="en-US" sz="1000" dirty="0"/>
                     </a:p>
@@ -13989,10 +14013,9 @@
                         <a:buNone/>
                       </a:pPr>
                       <a:r>
-                        <a:rPr lang="ko-KR" altLang="en-US" sz="1000"/>
+                        <a:rPr lang="ko-KR" altLang="en-US" sz="1000" dirty="0"/>
                         <a:t>발사 속도가 빠름</a:t>
                       </a:r>
-                      <a:endParaRPr lang="ko-KR" altLang="en-US" sz="1000" dirty="0"/>
                     </a:p>
                   </a:txBody>
                   <a:tcPr anchor="ctr">
@@ -15026,7 +15049,7 @@
           <p:nvPr>
             <p:extLst>
               <p:ext uri="{D42A27DB-BD31-4B8C-83A1-F6EECF244321}">
-                <p14:modId xmlns:p14="http://schemas.microsoft.com/office/powerpoint/2010/main" val="2510224426"/>
+                <p14:modId xmlns:p14="http://schemas.microsoft.com/office/powerpoint/2010/main" val="2640573997"/>
               </p:ext>
             </p:extLst>
           </p:nvPr>
@@ -16525,7 +16548,7 @@
                       </a:pPr>
                       <a:r>
                         <a:rPr lang="en-US" altLang="ko-KR" sz="1000" dirty="0"/>
-                        <a:t>1.0</a:t>
+                        <a:t>10</a:t>
                       </a:r>
                       <a:endParaRPr lang="ko-KR" altLang="en-US" sz="1000" dirty="0"/>
                     </a:p>
@@ -17618,7 +17641,7 @@
           <p:nvPr>
             <p:extLst>
               <p:ext uri="{D42A27DB-BD31-4B8C-83A1-F6EECF244321}">
-                <p14:modId xmlns:p14="http://schemas.microsoft.com/office/powerpoint/2010/main" val="1472401902"/>
+                <p14:modId xmlns:p14="http://schemas.microsoft.com/office/powerpoint/2010/main" val="3586509029"/>
               </p:ext>
             </p:extLst>
           </p:nvPr>
@@ -19116,8 +19139,8 @@
                         <a:buNone/>
                       </a:pPr>
                       <a:r>
-                        <a:rPr lang="en-US" altLang="ko-KR" sz="1000" dirty="0"/>
-                        <a:t>1.0</a:t>
+                        <a:rPr lang="en-US" altLang="ko-KR" sz="1000"/>
+                        <a:t>8.5</a:t>
                       </a:r>
                       <a:endParaRPr lang="ko-KR" altLang="en-US" sz="1000" dirty="0"/>
                     </a:p>
@@ -19180,7 +19203,7 @@
                       </a:pPr>
                       <a:r>
                         <a:rPr lang="ko-KR" altLang="en-US" sz="1000" dirty="0"/>
-                        <a:t>기본 캐릭터와 동일</a:t>
+                        <a:t>기본 캐릭터보다 느림</a:t>
                       </a:r>
                       <a:r>
                         <a:rPr lang="en-US" altLang="ko-KR" sz="1000" dirty="0"/>
@@ -20420,7 +20443,7 @@
           <p:nvPr>
             <p:extLst>
               <p:ext uri="{D42A27DB-BD31-4B8C-83A1-F6EECF244321}">
-                <p14:modId xmlns:p14="http://schemas.microsoft.com/office/powerpoint/2010/main" val="3958125601"/>
+                <p14:modId xmlns:p14="http://schemas.microsoft.com/office/powerpoint/2010/main" val="795563387"/>
               </p:ext>
             </p:extLst>
           </p:nvPr>
@@ -22233,7 +22256,7 @@
                       </a:pPr>
                       <a:r>
                         <a:rPr lang="en-US" altLang="ko-KR" sz="1000" dirty="0"/>
-                        <a:t>1.0</a:t>
+                        <a:t>10</a:t>
                       </a:r>
                       <a:endParaRPr lang="ko-KR" altLang="en-US" sz="1000" dirty="0"/>
                     </a:p>
@@ -23376,7 +23399,7 @@
           <p:nvPr>
             <p:extLst>
               <p:ext uri="{D42A27DB-BD31-4B8C-83A1-F6EECF244321}">
-                <p14:modId xmlns:p14="http://schemas.microsoft.com/office/powerpoint/2010/main" val="970714912"/>
+                <p14:modId xmlns:p14="http://schemas.microsoft.com/office/powerpoint/2010/main" val="1031998"/>
               </p:ext>
             </p:extLst>
           </p:nvPr>
@@ -25226,7 +25249,7 @@
                       </a:pPr>
                       <a:r>
                         <a:rPr lang="en-US" altLang="ko-KR" sz="1000" dirty="0"/>
-                        <a:t>1.0</a:t>
+                        <a:t>10</a:t>
                       </a:r>
                       <a:endParaRPr lang="ko-KR" altLang="en-US" sz="1000" dirty="0"/>
                     </a:p>

</xml_diff>